<commit_message>
version 1 to version 2
</commit_message>
<xml_diff>
--- a/version.pptx
+++ b/version.pptx
@@ -288,6 +288,7 @@
           <a:p>
             <a:fld id="{B3AD23A9-9F94-4751-A9EA-45CF612F8156}" type="datetimeFigureOut">
               <a:rPr lang="fr-BE" smtClean="0"/>
+              <a:pPr/>
               <a:t>7/01/2014</a:t>
             </a:fld>
             <a:endParaRPr lang="fr-BE"/>
@@ -330,6 +331,7 @@
           <a:p>
             <a:fld id="{1DCB7F67-6B95-438A-9283-61E8936DA41B}" type="slidenum">
               <a:rPr lang="fr-BE" smtClean="0"/>
+              <a:pPr/>
               <a:t>‹N°›</a:t>
             </a:fld>
             <a:endParaRPr lang="fr-BE"/>
@@ -453,6 +455,7 @@
           <a:p>
             <a:fld id="{B3AD23A9-9F94-4751-A9EA-45CF612F8156}" type="datetimeFigureOut">
               <a:rPr lang="fr-BE" smtClean="0"/>
+              <a:pPr/>
               <a:t>7/01/2014</a:t>
             </a:fld>
             <a:endParaRPr lang="fr-BE"/>
@@ -495,6 +498,7 @@
           <a:p>
             <a:fld id="{1DCB7F67-6B95-438A-9283-61E8936DA41B}" type="slidenum">
               <a:rPr lang="fr-BE" smtClean="0"/>
+              <a:pPr/>
               <a:t>‹N°›</a:t>
             </a:fld>
             <a:endParaRPr lang="fr-BE"/>
@@ -628,6 +632,7 @@
           <a:p>
             <a:fld id="{B3AD23A9-9F94-4751-A9EA-45CF612F8156}" type="datetimeFigureOut">
               <a:rPr lang="fr-BE" smtClean="0"/>
+              <a:pPr/>
               <a:t>7/01/2014</a:t>
             </a:fld>
             <a:endParaRPr lang="fr-BE"/>
@@ -670,6 +675,7 @@
           <a:p>
             <a:fld id="{1DCB7F67-6B95-438A-9283-61E8936DA41B}" type="slidenum">
               <a:rPr lang="fr-BE" smtClean="0"/>
+              <a:pPr/>
               <a:t>‹N°›</a:t>
             </a:fld>
             <a:endParaRPr lang="fr-BE"/>
@@ -793,6 +799,7 @@
           <a:p>
             <a:fld id="{B3AD23A9-9F94-4751-A9EA-45CF612F8156}" type="datetimeFigureOut">
               <a:rPr lang="fr-BE" smtClean="0"/>
+              <a:pPr/>
               <a:t>7/01/2014</a:t>
             </a:fld>
             <a:endParaRPr lang="fr-BE"/>
@@ -835,6 +842,7 @@
           <a:p>
             <a:fld id="{1DCB7F67-6B95-438A-9283-61E8936DA41B}" type="slidenum">
               <a:rPr lang="fr-BE" smtClean="0"/>
+              <a:pPr/>
               <a:t>‹N°›</a:t>
             </a:fld>
             <a:endParaRPr lang="fr-BE"/>
@@ -1034,6 +1042,7 @@
           <a:p>
             <a:fld id="{B3AD23A9-9F94-4751-A9EA-45CF612F8156}" type="datetimeFigureOut">
               <a:rPr lang="fr-BE" smtClean="0"/>
+              <a:pPr/>
               <a:t>7/01/2014</a:t>
             </a:fld>
             <a:endParaRPr lang="fr-BE"/>
@@ -1076,6 +1085,7 @@
           <a:p>
             <a:fld id="{1DCB7F67-6B95-438A-9283-61E8936DA41B}" type="slidenum">
               <a:rPr lang="fr-BE" smtClean="0"/>
+              <a:pPr/>
               <a:t>‹N°›</a:t>
             </a:fld>
             <a:endParaRPr lang="fr-BE"/>
@@ -1317,6 +1327,7 @@
           <a:p>
             <a:fld id="{B3AD23A9-9F94-4751-A9EA-45CF612F8156}" type="datetimeFigureOut">
               <a:rPr lang="fr-BE" smtClean="0"/>
+              <a:pPr/>
               <a:t>7/01/2014</a:t>
             </a:fld>
             <a:endParaRPr lang="fr-BE"/>
@@ -1359,6 +1370,7 @@
           <a:p>
             <a:fld id="{1DCB7F67-6B95-438A-9283-61E8936DA41B}" type="slidenum">
               <a:rPr lang="fr-BE" smtClean="0"/>
+              <a:pPr/>
               <a:t>‹N°›</a:t>
             </a:fld>
             <a:endParaRPr lang="fr-BE"/>
@@ -1734,6 +1746,7 @@
           <a:p>
             <a:fld id="{B3AD23A9-9F94-4751-A9EA-45CF612F8156}" type="datetimeFigureOut">
               <a:rPr lang="fr-BE" smtClean="0"/>
+              <a:pPr/>
               <a:t>7/01/2014</a:t>
             </a:fld>
             <a:endParaRPr lang="fr-BE"/>
@@ -1776,6 +1789,7 @@
           <a:p>
             <a:fld id="{1DCB7F67-6B95-438A-9283-61E8936DA41B}" type="slidenum">
               <a:rPr lang="fr-BE" smtClean="0"/>
+              <a:pPr/>
               <a:t>‹N°›</a:t>
             </a:fld>
             <a:endParaRPr lang="fr-BE"/>
@@ -1847,6 +1861,7 @@
           <a:p>
             <a:fld id="{B3AD23A9-9F94-4751-A9EA-45CF612F8156}" type="datetimeFigureOut">
               <a:rPr lang="fr-BE" smtClean="0"/>
+              <a:pPr/>
               <a:t>7/01/2014</a:t>
             </a:fld>
             <a:endParaRPr lang="fr-BE"/>
@@ -1889,6 +1904,7 @@
           <a:p>
             <a:fld id="{1DCB7F67-6B95-438A-9283-61E8936DA41B}" type="slidenum">
               <a:rPr lang="fr-BE" smtClean="0"/>
+              <a:pPr/>
               <a:t>‹N°›</a:t>
             </a:fld>
             <a:endParaRPr lang="fr-BE"/>
@@ -1937,6 +1953,7 @@
           <a:p>
             <a:fld id="{B3AD23A9-9F94-4751-A9EA-45CF612F8156}" type="datetimeFigureOut">
               <a:rPr lang="fr-BE" smtClean="0"/>
+              <a:pPr/>
               <a:t>7/01/2014</a:t>
             </a:fld>
             <a:endParaRPr lang="fr-BE"/>
@@ -1979,6 +1996,7 @@
           <a:p>
             <a:fld id="{1DCB7F67-6B95-438A-9283-61E8936DA41B}" type="slidenum">
               <a:rPr lang="fr-BE" smtClean="0"/>
+              <a:pPr/>
               <a:t>‹N°›</a:t>
             </a:fld>
             <a:endParaRPr lang="fr-BE"/>
@@ -2209,6 +2227,7 @@
           <a:p>
             <a:fld id="{B3AD23A9-9F94-4751-A9EA-45CF612F8156}" type="datetimeFigureOut">
               <a:rPr lang="fr-BE" smtClean="0"/>
+              <a:pPr/>
               <a:t>7/01/2014</a:t>
             </a:fld>
             <a:endParaRPr lang="fr-BE"/>
@@ -2251,6 +2270,7 @@
           <a:p>
             <a:fld id="{1DCB7F67-6B95-438A-9283-61E8936DA41B}" type="slidenum">
               <a:rPr lang="fr-BE" smtClean="0"/>
+              <a:pPr/>
               <a:t>‹N°›</a:t>
             </a:fld>
             <a:endParaRPr lang="fr-BE"/>
@@ -2457,6 +2477,7 @@
           <a:p>
             <a:fld id="{B3AD23A9-9F94-4751-A9EA-45CF612F8156}" type="datetimeFigureOut">
               <a:rPr lang="fr-BE" smtClean="0"/>
+              <a:pPr/>
               <a:t>7/01/2014</a:t>
             </a:fld>
             <a:endParaRPr lang="fr-BE"/>
@@ -2499,6 +2520,7 @@
           <a:p>
             <a:fld id="{1DCB7F67-6B95-438A-9283-61E8936DA41B}" type="slidenum">
               <a:rPr lang="fr-BE" smtClean="0"/>
+              <a:pPr/>
               <a:t>‹N°›</a:t>
             </a:fld>
             <a:endParaRPr lang="fr-BE"/>
@@ -2665,6 +2687,7 @@
           <a:p>
             <a:fld id="{B3AD23A9-9F94-4751-A9EA-45CF612F8156}" type="datetimeFigureOut">
               <a:rPr lang="fr-BE" smtClean="0"/>
+              <a:pPr/>
               <a:t>7/01/2014</a:t>
             </a:fld>
             <a:endParaRPr lang="fr-BE"/>
@@ -2743,6 +2766,7 @@
           <a:p>
             <a:fld id="{1DCB7F67-6B95-438A-9283-61E8936DA41B}" type="slidenum">
               <a:rPr lang="fr-BE" smtClean="0"/>
+              <a:pPr/>
               <a:t>‹N°›</a:t>
             </a:fld>
             <a:endParaRPr lang="fr-BE"/>
@@ -3052,9 +3076,9 @@
           <a:p>
             <a:r>
               <a:rPr lang="fr-FR" smtClean="0"/>
-              <a:t>version1</a:t>
-            </a:r>
-            <a:endParaRPr lang="fr-BE"/>
+              <a:t>version2</a:t>
+            </a:r>
+            <a:endParaRPr lang="fr-BE" dirty="0"/>
           </a:p>
         </p:txBody>
       </p:sp>

</xml_diff>